<commit_message>
minor additions to 10
</commit_message>
<xml_diff>
--- a/presentations/10 - The Wrapup.pptx
+++ b/presentations/10 - The Wrapup.pptx
@@ -117,6 +117,11 @@
       </a:defRPr>
     </a:lvl9pPr>
   </p:defaultTextStyle>
+  <p:extLst>
+    <p:ext uri="{EFAFB233-063F-42B5-8137-9DF3F51BA10A}">
+      <p15:sldGuideLst xmlns:p15="http://schemas.microsoft.com/office/powerpoint/2012/main"/>
+    </p:ext>
+  </p:extLst>
 </p:presentation>
 </file>
 
@@ -202,7 +207,7 @@
           <a:p>
             <a:fld id="{4939F8F8-93F0-4725-B8AC-62F8A64AB462}" type="datetimeFigureOut">
               <a:rPr lang="en-US" smtClean="0"/>
-              <a:t>11/11/2023</a:t>
+              <a:t>11/12/2023</a:t>
             </a:fld>
             <a:endParaRPr lang="en-US"/>
           </a:p>
@@ -932,7 +937,7 @@
           <a:p>
             <a:fld id="{5AE7D92D-7924-41BC-B683-3648DB58E650}" type="datetimeFigureOut">
               <a:rPr lang="en-US" smtClean="0"/>
-              <a:t>11/11/2023</a:t>
+              <a:t>11/12/2023</a:t>
             </a:fld>
             <a:endParaRPr lang="en-US"/>
           </a:p>
@@ -12885,7 +12890,7 @@
           <a:p>
             <a:fld id="{5AE7D92D-7924-41BC-B683-3648DB58E650}" type="datetimeFigureOut">
               <a:rPr lang="en-US" smtClean="0"/>
-              <a:t>11/11/2023</a:t>
+              <a:t>11/12/2023</a:t>
             </a:fld>
             <a:endParaRPr lang="en-US"/>
           </a:p>
@@ -13093,7 +13098,7 @@
           <a:p>
             <a:fld id="{5AE7D92D-7924-41BC-B683-3648DB58E650}" type="datetimeFigureOut">
               <a:rPr lang="en-US" smtClean="0"/>
-              <a:t>11/11/2023</a:t>
+              <a:t>11/12/2023</a:t>
             </a:fld>
             <a:endParaRPr lang="en-US"/>
           </a:p>
@@ -25489,7 +25494,7 @@
           <a:p>
             <a:fld id="{5AE7D92D-7924-41BC-B683-3648DB58E650}" type="datetimeFigureOut">
               <a:rPr lang="en-US" smtClean="0"/>
-              <a:t>11/11/2023</a:t>
+              <a:t>11/12/2023</a:t>
             </a:fld>
             <a:endParaRPr lang="en-US"/>
           </a:p>
@@ -25891,7 +25896,7 @@
           <a:p>
             <a:fld id="{5AE7D92D-7924-41BC-B683-3648DB58E650}" type="datetimeFigureOut">
               <a:rPr lang="en-US" smtClean="0"/>
-              <a:t>11/11/2023</a:t>
+              <a:t>11/12/2023</a:t>
             </a:fld>
             <a:endParaRPr lang="en-US"/>
           </a:p>
@@ -26156,7 +26161,7 @@
           <a:p>
             <a:fld id="{5AE7D92D-7924-41BC-B683-3648DB58E650}" type="datetimeFigureOut">
               <a:rPr lang="en-US" smtClean="0"/>
-              <a:t>11/11/2023</a:t>
+              <a:t>11/12/2023</a:t>
             </a:fld>
             <a:endParaRPr lang="en-US"/>
           </a:p>
@@ -26568,7 +26573,7 @@
           <a:p>
             <a:fld id="{5AE7D92D-7924-41BC-B683-3648DB58E650}" type="datetimeFigureOut">
               <a:rPr lang="en-US" smtClean="0"/>
-              <a:t>11/11/2023</a:t>
+              <a:t>11/12/2023</a:t>
             </a:fld>
             <a:endParaRPr lang="en-US"/>
           </a:p>
@@ -26709,7 +26714,7 @@
           <a:p>
             <a:fld id="{5AE7D92D-7924-41BC-B683-3648DB58E650}" type="datetimeFigureOut">
               <a:rPr lang="en-US" smtClean="0"/>
-              <a:t>11/11/2023</a:t>
+              <a:t>11/12/2023</a:t>
             </a:fld>
             <a:endParaRPr lang="en-US"/>
           </a:p>
@@ -26822,7 +26827,7 @@
           <a:p>
             <a:fld id="{5AE7D92D-7924-41BC-B683-3648DB58E650}" type="datetimeFigureOut">
               <a:rPr lang="en-US" smtClean="0"/>
-              <a:t>11/11/2023</a:t>
+              <a:t>11/12/2023</a:t>
             </a:fld>
             <a:endParaRPr lang="en-US"/>
           </a:p>
@@ -27133,7 +27138,7 @@
           <a:p>
             <a:fld id="{5AE7D92D-7924-41BC-B683-3648DB58E650}" type="datetimeFigureOut">
               <a:rPr lang="en-US" smtClean="0"/>
-              <a:t>11/11/2023</a:t>
+              <a:t>11/12/2023</a:t>
             </a:fld>
             <a:endParaRPr lang="en-US"/>
           </a:p>
@@ -27421,7 +27426,7 @@
           <a:p>
             <a:fld id="{5AE7D92D-7924-41BC-B683-3648DB58E650}" type="datetimeFigureOut">
               <a:rPr lang="en-US" smtClean="0"/>
-              <a:t>11/11/2023</a:t>
+              <a:t>11/12/2023</a:t>
             </a:fld>
             <a:endParaRPr lang="en-US"/>
           </a:p>
@@ -27662,7 +27667,7 @@
           <a:p>
             <a:fld id="{5AE7D92D-7924-41BC-B683-3648DB58E650}" type="datetimeFigureOut">
               <a:rPr lang="en-US" smtClean="0"/>
-              <a:t>11/11/2023</a:t>
+              <a:t>11/12/2023</a:t>
             </a:fld>
             <a:endParaRPr lang="en-US"/>
           </a:p>
@@ -29025,11 +29030,11 @@
             </a:pPr>
             <a:r>
               <a:rPr lang="en-US" i="1" dirty="0"/>
-              <a:t>Alan Turing </a:t>
+              <a:t>Megan Higgs </a:t>
             </a:r>
             <a:r>
               <a:rPr lang="en-US" dirty="0"/>
-              <a:t>(AI)</a:t>
+              <a:t>(MSU)</a:t>
             </a:r>
           </a:p>
           <a:p>
@@ -29039,19 +29044,11 @@
             </a:pPr>
             <a:r>
               <a:rPr lang="en-US" i="1" dirty="0"/>
-              <a:t>Hari Seldon </a:t>
+              <a:t>Jim Robison-Cox </a:t>
             </a:r>
             <a:r>
               <a:rPr lang="en-US" dirty="0"/>
-              <a:t>(</a:t>
-            </a:r>
-            <a:r>
-              <a:rPr lang="en-US" dirty="0" err="1"/>
-              <a:t>Trantor</a:t>
-            </a:r>
-            <a:r>
-              <a:rPr lang="en-US" dirty="0"/>
-              <a:t>)</a:t>
+              <a:t>(MSU)</a:t>
             </a:r>
           </a:p>
           <a:p>
@@ -29061,11 +29058,11 @@
             </a:pPr>
             <a:r>
               <a:rPr lang="en-US" i="1" dirty="0"/>
-              <a:t>HAL </a:t>
+              <a:t>Hadley Wickham </a:t>
             </a:r>
             <a:r>
               <a:rPr lang="en-US" dirty="0"/>
-              <a:t>(Clarke)</a:t>
+              <a:t>(RStudio)</a:t>
             </a:r>
           </a:p>
           <a:p>
@@ -29074,12 +29071,16 @@
               <a:buNone/>
             </a:pPr>
             <a:r>
+              <a:rPr lang="en-US" i="1" dirty="0" err="1"/>
+              <a:t>Yihui</a:t>
+            </a:r>
+            <a:r>
               <a:rPr lang="en-US" i="1" dirty="0"/>
-              <a:t>Tim Berners-Lee </a:t>
+              <a:t> Xie </a:t>
             </a:r>
             <a:r>
               <a:rPr lang="en-US" dirty="0"/>
-              <a:t>(CERN)</a:t>
+              <a:t>(RStudio)</a:t>
             </a:r>
           </a:p>
           <a:p>
@@ -29088,11 +29089,53 @@
             </a:pPr>
             <a:r>
               <a:rPr lang="en-US" i="1" dirty="0"/>
-              <a:t>Inigo Montoya </a:t>
+              <a:t>Mike Boyd </a:t>
             </a:r>
             <a:r>
               <a:rPr lang="en-US" dirty="0"/>
-              <a:t>(Spaniard)</a:t>
+              <a:t>(</a:t>
+            </a:r>
+            <a:r>
+              <a:rPr lang="en-US" dirty="0" err="1"/>
+              <a:t>Youtube</a:t>
+            </a:r>
+            <a:r>
+              <a:rPr lang="en-US" dirty="0"/>
+              <a:t>)</a:t>
+            </a:r>
+          </a:p>
+          <a:p>
+            <a:pPr marL="1654175">
+              <a:buNone/>
+            </a:pPr>
+            <a:r>
+              <a:rPr lang="en-US" i="1" dirty="0"/>
+              <a:t>Grant Sanderson </a:t>
+            </a:r>
+            <a:r>
+              <a:rPr lang="en-US" dirty="0"/>
+              <a:t>(</a:t>
+            </a:r>
+            <a:r>
+              <a:rPr lang="en-US" dirty="0" err="1"/>
+              <a:t>Youtube</a:t>
+            </a:r>
+            <a:r>
+              <a:rPr lang="en-US" dirty="0"/>
+              <a:t>)</a:t>
+            </a:r>
+          </a:p>
+          <a:p>
+            <a:pPr marL="1654175">
+              <a:buNone/>
+            </a:pPr>
+            <a:r>
+              <a:rPr lang="en-US" i="1" dirty="0"/>
+              <a:t>Adam Reimer </a:t>
+            </a:r>
+            <a:r>
+              <a:rPr lang="en-US" dirty="0"/>
+              <a:t>(ADF&amp;G)</a:t>
             </a:r>
           </a:p>
           <a:p>
@@ -29100,14 +29143,7 @@
               <a:buFont typeface="Arial" panose="020B0604020202020204" pitchFamily="34" charset="0"/>
               <a:buNone/>
             </a:pPr>
-            <a:r>
-              <a:rPr lang="en-US" i="1" dirty="0"/>
-              <a:t>Marvin Minsky </a:t>
-            </a:r>
-            <a:r>
-              <a:rPr lang="en-US" dirty="0"/>
-              <a:t>(MIT)</a:t>
-            </a:r>
+            <a:endParaRPr lang="en-US" dirty="0"/>
           </a:p>
           <a:p>
             <a:pPr marL="1654175">
@@ -29316,7 +29352,7 @@
             </a:pPr>
             <a:r>
               <a:rPr lang="en-US" dirty="0"/>
-              <a:t>People who have taught &amp; helped us or whose code we’ve have shamelessly copied and learned from:</a:t>
+              <a:t>People who have taught, helped, or inspired us, or whose code we’ve have shamelessly copied and learned from:</a:t>
             </a:r>
           </a:p>
         </p:txBody>
@@ -29565,7 +29601,7 @@
             </a:pPr>
             <a:r>
               <a:rPr lang="en-US" sz="3200" dirty="0"/>
-              <a:t>6) </a:t>
+              <a:t>6) Pseudocode is the best code</a:t>
             </a:r>
           </a:p>
           <a:p>
@@ -29574,7 +29610,7 @@
             </a:pPr>
             <a:r>
               <a:rPr lang="en-US" sz="3200" dirty="0"/>
-              <a:t>7)</a:t>
+              <a:t>7) Generalize &amp; modularize</a:t>
             </a:r>
           </a:p>
           <a:p>
@@ -29583,7 +29619,7 @@
             </a:pPr>
             <a:r>
               <a:rPr lang="en-US" sz="3200" dirty="0"/>
-              <a:t>8)</a:t>
+              <a:t>8) Be patient (with yourself)</a:t>
             </a:r>
           </a:p>
           <a:p>
@@ -29592,7 +29628,7 @@
             </a:pPr>
             <a:r>
               <a:rPr lang="en-US" sz="3200" dirty="0"/>
-              <a:t>9)</a:t>
+              <a:t>9) Celebrate the wins!</a:t>
             </a:r>
           </a:p>
           <a:p>
@@ -29601,7 +29637,7 @@
             </a:pPr>
             <a:r>
               <a:rPr lang="en-US" sz="3200" dirty="0"/>
-              <a:t>10)</a:t>
+              <a:t>10) Build something fun for you</a:t>
             </a:r>
             <a:endParaRPr lang="en-US" sz="2000" dirty="0"/>
           </a:p>
@@ -31964,13 +32000,13 @@
               <a:t>Data Organization in Spreadsheets</a:t>
             </a:r>
             <a:endParaRPr lang="en-US" dirty="0">
-              <a:hlinkClick r:id=""/>
+              <a:hlinkClick r:id="" action="ppaction://noaction"/>
             </a:endParaRPr>
           </a:p>
           <a:p>
             <a:r>
               <a:rPr lang="en-US" dirty="0">
-                <a:hlinkClick r:id=""/>
+                <a:hlinkClick r:id="" action="ppaction://noaction"/>
               </a:rPr>
               <a:t>https://annebeaudreau.com/2018/02/04/data-management-tips/</a:t>
             </a:r>

</xml_diff>

<commit_message>
tiny edits to ppts 8 and 10
</commit_message>
<xml_diff>
--- a/presentations/10 - The Wrapup.pptx
+++ b/presentations/10 - The Wrapup.pptx
@@ -207,7 +207,7 @@
           <a:p>
             <a:fld id="{4939F8F8-93F0-4725-B8AC-62F8A64AB462}" type="datetimeFigureOut">
               <a:rPr lang="en-US" smtClean="0"/>
-              <a:t>11/12/2023</a:t>
+              <a:t>12/8/2023</a:t>
             </a:fld>
             <a:endParaRPr lang="en-US"/>
           </a:p>
@@ -937,7 +937,7 @@
           <a:p>
             <a:fld id="{5AE7D92D-7924-41BC-B683-3648DB58E650}" type="datetimeFigureOut">
               <a:rPr lang="en-US" smtClean="0"/>
-              <a:t>11/12/2023</a:t>
+              <a:t>12/8/2023</a:t>
             </a:fld>
             <a:endParaRPr lang="en-US"/>
           </a:p>
@@ -12890,7 +12890,7 @@
           <a:p>
             <a:fld id="{5AE7D92D-7924-41BC-B683-3648DB58E650}" type="datetimeFigureOut">
               <a:rPr lang="en-US" smtClean="0"/>
-              <a:t>11/12/2023</a:t>
+              <a:t>12/8/2023</a:t>
             </a:fld>
             <a:endParaRPr lang="en-US"/>
           </a:p>
@@ -13098,7 +13098,7 @@
           <a:p>
             <a:fld id="{5AE7D92D-7924-41BC-B683-3648DB58E650}" type="datetimeFigureOut">
               <a:rPr lang="en-US" smtClean="0"/>
-              <a:t>11/12/2023</a:t>
+              <a:t>12/8/2023</a:t>
             </a:fld>
             <a:endParaRPr lang="en-US"/>
           </a:p>
@@ -25494,7 +25494,7 @@
           <a:p>
             <a:fld id="{5AE7D92D-7924-41BC-B683-3648DB58E650}" type="datetimeFigureOut">
               <a:rPr lang="en-US" smtClean="0"/>
-              <a:t>11/12/2023</a:t>
+              <a:t>12/8/2023</a:t>
             </a:fld>
             <a:endParaRPr lang="en-US"/>
           </a:p>
@@ -25896,7 +25896,7 @@
           <a:p>
             <a:fld id="{5AE7D92D-7924-41BC-B683-3648DB58E650}" type="datetimeFigureOut">
               <a:rPr lang="en-US" smtClean="0"/>
-              <a:t>11/12/2023</a:t>
+              <a:t>12/8/2023</a:t>
             </a:fld>
             <a:endParaRPr lang="en-US"/>
           </a:p>
@@ -26161,7 +26161,7 @@
           <a:p>
             <a:fld id="{5AE7D92D-7924-41BC-B683-3648DB58E650}" type="datetimeFigureOut">
               <a:rPr lang="en-US" smtClean="0"/>
-              <a:t>11/12/2023</a:t>
+              <a:t>12/8/2023</a:t>
             </a:fld>
             <a:endParaRPr lang="en-US"/>
           </a:p>
@@ -26573,7 +26573,7 @@
           <a:p>
             <a:fld id="{5AE7D92D-7924-41BC-B683-3648DB58E650}" type="datetimeFigureOut">
               <a:rPr lang="en-US" smtClean="0"/>
-              <a:t>11/12/2023</a:t>
+              <a:t>12/8/2023</a:t>
             </a:fld>
             <a:endParaRPr lang="en-US"/>
           </a:p>
@@ -26714,7 +26714,7 @@
           <a:p>
             <a:fld id="{5AE7D92D-7924-41BC-B683-3648DB58E650}" type="datetimeFigureOut">
               <a:rPr lang="en-US" smtClean="0"/>
-              <a:t>11/12/2023</a:t>
+              <a:t>12/8/2023</a:t>
             </a:fld>
             <a:endParaRPr lang="en-US"/>
           </a:p>
@@ -26827,7 +26827,7 @@
           <a:p>
             <a:fld id="{5AE7D92D-7924-41BC-B683-3648DB58E650}" type="datetimeFigureOut">
               <a:rPr lang="en-US" smtClean="0"/>
-              <a:t>11/12/2023</a:t>
+              <a:t>12/8/2023</a:t>
             </a:fld>
             <a:endParaRPr lang="en-US"/>
           </a:p>
@@ -27138,7 +27138,7 @@
           <a:p>
             <a:fld id="{5AE7D92D-7924-41BC-B683-3648DB58E650}" type="datetimeFigureOut">
               <a:rPr lang="en-US" smtClean="0"/>
-              <a:t>11/12/2023</a:t>
+              <a:t>12/8/2023</a:t>
             </a:fld>
             <a:endParaRPr lang="en-US"/>
           </a:p>
@@ -27426,7 +27426,7 @@
           <a:p>
             <a:fld id="{5AE7D92D-7924-41BC-B683-3648DB58E650}" type="datetimeFigureOut">
               <a:rPr lang="en-US" smtClean="0"/>
-              <a:t>11/12/2023</a:t>
+              <a:t>12/8/2023</a:t>
             </a:fld>
             <a:endParaRPr lang="en-US"/>
           </a:p>
@@ -27667,7 +27667,7 @@
           <a:p>
             <a:fld id="{5AE7D92D-7924-41BC-B683-3648DB58E650}" type="datetimeFigureOut">
               <a:rPr lang="en-US" smtClean="0"/>
-              <a:t>11/12/2023</a:t>
+              <a:t>12/8/2023</a:t>
             </a:fld>
             <a:endParaRPr lang="en-US"/>
           </a:p>
@@ -29058,6 +29058,20 @@
             </a:pPr>
             <a:r>
               <a:rPr lang="en-US" i="1" dirty="0"/>
+              <a:t>Al Parker </a:t>
+            </a:r>
+            <a:r>
+              <a:rPr lang="en-US" dirty="0"/>
+              <a:t>(MSU)</a:t>
+            </a:r>
+          </a:p>
+          <a:p>
+            <a:pPr marL="1654175">
+              <a:buFont typeface="Arial" panose="020B0604020202020204" pitchFamily="34" charset="0"/>
+              <a:buNone/>
+            </a:pPr>
+            <a:r>
+              <a:rPr lang="en-US" i="1" dirty="0"/>
               <a:t>Hadley Wickham </a:t>
             </a:r>
             <a:r>
@@ -29080,32 +29094,12 @@
             </a:r>
             <a:r>
               <a:rPr lang="en-US" dirty="0"/>
-              <a:t>(RStudio)</a:t>
+              <a:t>(RStudio) </a:t>
             </a:r>
           </a:p>
           <a:p>
             <a:pPr marL="1654175">
-              <a:buNone/>
-            </a:pPr>
-            <a:r>
-              <a:rPr lang="en-US" i="1" dirty="0"/>
-              <a:t>Mike Boyd </a:t>
-            </a:r>
-            <a:r>
-              <a:rPr lang="en-US" dirty="0"/>
-              <a:t>(</a:t>
-            </a:r>
-            <a:r>
-              <a:rPr lang="en-US" dirty="0" err="1"/>
-              <a:t>Youtube</a:t>
-            </a:r>
-            <a:r>
-              <a:rPr lang="en-US" dirty="0"/>
-              <a:t>)</a:t>
-            </a:r>
-          </a:p>
-          <a:p>
-            <a:pPr marL="1654175">
+              <a:buFont typeface="Arial" panose="020B0604020202020204" pitchFamily="34" charset="0"/>
               <a:buNone/>
             </a:pPr>
             <a:r>

</xml_diff>